<commit_message>
slides de Stefana modifies
</commit_message>
<xml_diff>
--- a/rapports/presentation/presentationFinale.pptx
+++ b/rapports/presentation/presentationFinale.pptx
@@ -403,11 +403,11 @@
         </c:dLbls>
         <c:marker val="1"/>
         <c:smooth val="0"/>
-        <c:axId val="152183936"/>
-        <c:axId val="152185472"/>
+        <c:axId val="149895040"/>
+        <c:axId val="149896576"/>
       </c:lineChart>
       <c:catAx>
-        <c:axId val="152183936"/>
+        <c:axId val="149895040"/>
         <c:scaling>
           <c:orientation val="minMax"/>
         </c:scaling>
@@ -416,7 +416,7 @@
         <c:majorTickMark val="out"/>
         <c:minorTickMark val="none"/>
         <c:tickLblPos val="nextTo"/>
-        <c:crossAx val="152185472"/>
+        <c:crossAx val="149896576"/>
         <c:crosses val="autoZero"/>
         <c:auto val="1"/>
         <c:lblAlgn val="ctr"/>
@@ -424,7 +424,7 @@
         <c:noMultiLvlLbl val="0"/>
       </c:catAx>
       <c:valAx>
-        <c:axId val="152185472"/>
+        <c:axId val="149896576"/>
         <c:scaling>
           <c:orientation val="minMax"/>
         </c:scaling>
@@ -435,7 +435,7 @@
         <c:majorTickMark val="out"/>
         <c:minorTickMark val="none"/>
         <c:tickLblPos val="nextTo"/>
-        <c:crossAx val="152183936"/>
+        <c:crossAx val="149895040"/>
         <c:crosses val="autoZero"/>
         <c:crossBetween val="between"/>
       </c:valAx>
@@ -3073,21 +3073,58 @@
           <a:pPr algn="ctr"/>
           <a:r>
             <a:rPr lang="fr-FR" dirty="0" smtClean="0"/>
-            <a:t>Service de gestion de la maintenance</a:t>
+            <a:t>Une </a:t>
+          </a:r>
+          <a:r>
+            <a:rPr lang="fr-FR" dirty="0" err="1" smtClean="0"/>
+            <a:t>activit</a:t>
+          </a:r>
+          <a:r>
+            <a:rPr lang="de-DE" dirty="0" smtClean="0"/>
+            <a:t>é </a:t>
+          </a:r>
+          <a:r>
+            <a:rPr lang="de-DE" dirty="0" err="1" smtClean="0"/>
+            <a:t>qui</a:t>
+          </a:r>
+          <a:r>
+            <a:rPr lang="de-DE" dirty="0" smtClean="0"/>
+            <a:t> </a:t>
+          </a:r>
+          <a:r>
+            <a:rPr lang="de-DE" dirty="0" err="1" smtClean="0"/>
+            <a:t>coûte</a:t>
+          </a:r>
+          <a:r>
+            <a:rPr lang="de-DE" dirty="0" smtClean="0"/>
+            <a:t> </a:t>
+          </a:r>
+          <a:r>
+            <a:rPr lang="de-DE" dirty="0" err="1" smtClean="0"/>
+            <a:t>chèr</a:t>
+          </a:r>
+          <a:endParaRPr lang="fr-FR" dirty="0" smtClean="0"/>
+        </a:p>
+        <a:p>
+          <a:pPr algn="ctr"/>
+          <a:r>
+            <a:rPr lang="fr-FR" dirty="0" smtClean="0"/>
+            <a:t>40 </a:t>
+          </a:r>
+          <a:r>
+            <a:rPr lang="fr-FR" dirty="0" err="1" smtClean="0"/>
+            <a:t>atéliers</a:t>
+          </a:r>
+          <a:r>
+            <a:rPr lang="fr-FR" dirty="0" smtClean="0"/>
+            <a:t> qui ne communiquent pas</a:t>
           </a:r>
         </a:p>
         <a:p>
           <a:pPr algn="ctr"/>
           <a:r>
             <a:rPr lang="fr-FR" dirty="0" smtClean="0"/>
-            <a:t>Gestion des sociétés de maintenance</a:t>
-          </a:r>
-        </a:p>
-        <a:p>
-          <a:pPr algn="ctr"/>
-          <a:r>
-            <a:rPr lang="fr-FR" dirty="0" smtClean="0"/>
-            <a:t>60 personnes  licenciées</a:t>
+            <a:t>Un stock de 10 M €</a:t>
           </a:r>
           <a:endParaRPr lang="en-US" dirty="0"/>
         </a:p>
@@ -3125,28 +3162,28 @@
           <a:pPr algn="ctr"/>
           <a:r>
             <a:rPr lang="fr-FR" dirty="0" smtClean="0"/>
-            <a:t>Améliorer la communication</a:t>
+            <a:t>Améliorer la planification d'affectation </a:t>
           </a:r>
         </a:p>
         <a:p>
           <a:pPr algn="ctr"/>
           <a:r>
             <a:rPr lang="fr-FR" dirty="0" smtClean="0"/>
-            <a:t>Plus d’autonomie pour les chantiers</a:t>
+            <a:t>Planification de la maintenance</a:t>
           </a:r>
         </a:p>
         <a:p>
           <a:pPr algn="ctr"/>
           <a:r>
             <a:rPr lang="fr-FR" dirty="0" smtClean="0"/>
-            <a:t>Superviser l’activité des chantiers</a:t>
+            <a:t>Planification des achats</a:t>
           </a:r>
         </a:p>
         <a:p>
           <a:pPr algn="ctr"/>
           <a:r>
             <a:rPr lang="fr-FR" dirty="0" smtClean="0"/>
-            <a:t>Augmenter l’efficacité du travail</a:t>
+            <a:t>Fournisseurs</a:t>
           </a:r>
           <a:endParaRPr lang="en-US" dirty="0"/>
         </a:p>
@@ -3263,12 +3300,12 @@
     </dgm:pt>
   </dgm:ptLst>
   <dgm:cxnLst>
+    <dgm:cxn modelId="{B8755B93-FDE7-4C63-9314-7EB09E2F4513}" type="presOf" srcId="{563608C0-AC27-45C2-9ED5-F9E6BA70AC3F}" destId="{79C67CC8-935B-405B-B2FF-82C277024EE4}" srcOrd="0" destOrd="0" presId="urn:microsoft.com/office/officeart/2008/layout/VerticalCurvedList"/>
+    <dgm:cxn modelId="{316A9A8A-3FF5-4D3E-8895-384868921F3E}" type="presOf" srcId="{819A4488-4A79-47B1-A9E5-2DB9C1F7468C}" destId="{D2D09B6D-330A-4671-908F-F4FA5B217D73}" srcOrd="0" destOrd="0" presId="urn:microsoft.com/office/officeart/2008/layout/VerticalCurvedList"/>
+    <dgm:cxn modelId="{100FEA02-CA2A-4B0E-838D-CCCE2B810B5C}" srcId="{4DC7D8B7-8F24-4007-90AC-52F37569343B}" destId="{819A4488-4A79-47B1-A9E5-2DB9C1F7468C}" srcOrd="0" destOrd="0" parTransId="{8932B3CF-DA08-4EED-88A4-55E21960DE08}" sibTransId="{2D35B78B-1D09-465A-AB68-2C1FF1A2AEA0}"/>
+    <dgm:cxn modelId="{41302258-B789-4D93-8539-B75CCC248221}" type="presOf" srcId="{2D35B78B-1D09-465A-AB68-2C1FF1A2AEA0}" destId="{B2C9D143-B324-4039-B99E-569AFEFA2017}" srcOrd="0" destOrd="0" presId="urn:microsoft.com/office/officeart/2008/layout/VerticalCurvedList"/>
     <dgm:cxn modelId="{C2C1A14A-6277-4772-9F66-283C63F44CE0}" srcId="{4DC7D8B7-8F24-4007-90AC-52F37569343B}" destId="{563608C0-AC27-45C2-9ED5-F9E6BA70AC3F}" srcOrd="1" destOrd="0" parTransId="{330CF5AE-F392-40AE-81C2-239BF868C6CE}" sibTransId="{6BFD8C6F-CF47-4100-A47C-DF47978C8B10}"/>
     <dgm:cxn modelId="{9475D457-62EF-41CA-B0DE-9C3260B6F82F}" type="presOf" srcId="{4DC7D8B7-8F24-4007-90AC-52F37569343B}" destId="{7678921B-E37C-41A4-8070-5287F882EB14}" srcOrd="0" destOrd="0" presId="urn:microsoft.com/office/officeart/2008/layout/VerticalCurvedList"/>
-    <dgm:cxn modelId="{100FEA02-CA2A-4B0E-838D-CCCE2B810B5C}" srcId="{4DC7D8B7-8F24-4007-90AC-52F37569343B}" destId="{819A4488-4A79-47B1-A9E5-2DB9C1F7468C}" srcOrd="0" destOrd="0" parTransId="{8932B3CF-DA08-4EED-88A4-55E21960DE08}" sibTransId="{2D35B78B-1D09-465A-AB68-2C1FF1A2AEA0}"/>
-    <dgm:cxn modelId="{316A9A8A-3FF5-4D3E-8895-384868921F3E}" type="presOf" srcId="{819A4488-4A79-47B1-A9E5-2DB9C1F7468C}" destId="{D2D09B6D-330A-4671-908F-F4FA5B217D73}" srcOrd="0" destOrd="0" presId="urn:microsoft.com/office/officeart/2008/layout/VerticalCurvedList"/>
-    <dgm:cxn modelId="{B8755B93-FDE7-4C63-9314-7EB09E2F4513}" type="presOf" srcId="{563608C0-AC27-45C2-9ED5-F9E6BA70AC3F}" destId="{79C67CC8-935B-405B-B2FF-82C277024EE4}" srcOrd="0" destOrd="0" presId="urn:microsoft.com/office/officeart/2008/layout/VerticalCurvedList"/>
-    <dgm:cxn modelId="{41302258-B789-4D93-8539-B75CCC248221}" type="presOf" srcId="{2D35B78B-1D09-465A-AB68-2C1FF1A2AEA0}" destId="{B2C9D143-B324-4039-B99E-569AFEFA2017}" srcOrd="0" destOrd="0" presId="urn:microsoft.com/office/officeart/2008/layout/VerticalCurvedList"/>
     <dgm:cxn modelId="{1A14BCD9-FF01-4A6F-8B9D-E8C9D0F9350A}" type="presParOf" srcId="{7678921B-E37C-41A4-8070-5287F882EB14}" destId="{DF15B877-2090-4411-A486-AA79D482FA32}" srcOrd="0" destOrd="0" presId="urn:microsoft.com/office/officeart/2008/layout/VerticalCurvedList"/>
     <dgm:cxn modelId="{DCBBD040-FF56-45CA-9519-903BCB15E916}" type="presParOf" srcId="{DF15B877-2090-4411-A486-AA79D482FA32}" destId="{7F99B7A4-49FA-4468-9DE1-D3A6FD2E7E72}" srcOrd="0" destOrd="0" presId="urn:microsoft.com/office/officeart/2008/layout/VerticalCurvedList"/>
     <dgm:cxn modelId="{68A01BEB-C194-441A-B73C-AA5D2DA69572}" type="presParOf" srcId="{7F99B7A4-49FA-4468-9DE1-D3A6FD2E7E72}" destId="{B74844D7-5E03-4899-B2C7-8F74FEAC98DA}" srcOrd="0" destOrd="0" presId="urn:microsoft.com/office/officeart/2008/layout/VerticalCurvedList"/>
@@ -3956,7 +3993,61 @@
           </a:pPr>
           <a:r>
             <a:rPr lang="fr-FR" sz="1300" kern="1200" dirty="0" smtClean="0"/>
-            <a:t>Service de gestion de la maintenance</a:t>
+            <a:t>Une </a:t>
+          </a:r>
+          <a:r>
+            <a:rPr lang="fr-FR" sz="1300" kern="1200" dirty="0" err="1" smtClean="0"/>
+            <a:t>activit</a:t>
+          </a:r>
+          <a:r>
+            <a:rPr lang="de-DE" sz="1300" kern="1200" dirty="0" smtClean="0"/>
+            <a:t>é </a:t>
+          </a:r>
+          <a:r>
+            <a:rPr lang="de-DE" sz="1300" kern="1200" dirty="0" err="1" smtClean="0"/>
+            <a:t>qui</a:t>
+          </a:r>
+          <a:r>
+            <a:rPr lang="de-DE" sz="1300" kern="1200" dirty="0" smtClean="0"/>
+            <a:t> </a:t>
+          </a:r>
+          <a:r>
+            <a:rPr lang="de-DE" sz="1300" kern="1200" dirty="0" err="1" smtClean="0"/>
+            <a:t>coûte</a:t>
+          </a:r>
+          <a:r>
+            <a:rPr lang="de-DE" sz="1300" kern="1200" dirty="0" smtClean="0"/>
+            <a:t> </a:t>
+          </a:r>
+          <a:r>
+            <a:rPr lang="de-DE" sz="1300" kern="1200" dirty="0" err="1" smtClean="0"/>
+            <a:t>chèr</a:t>
+          </a:r>
+          <a:endParaRPr lang="fr-FR" sz="1300" kern="1200" dirty="0" smtClean="0"/>
+        </a:p>
+        <a:p>
+          <a:pPr lvl="0" algn="ctr" defTabSz="577850">
+            <a:lnSpc>
+              <a:spcPct val="90000"/>
+            </a:lnSpc>
+            <a:spcBef>
+              <a:spcPct val="0"/>
+            </a:spcBef>
+            <a:spcAft>
+              <a:spcPct val="35000"/>
+            </a:spcAft>
+          </a:pPr>
+          <a:r>
+            <a:rPr lang="fr-FR" sz="1300" kern="1200" dirty="0" smtClean="0"/>
+            <a:t>40 </a:t>
+          </a:r>
+          <a:r>
+            <a:rPr lang="fr-FR" sz="1300" kern="1200" dirty="0" err="1" smtClean="0"/>
+            <a:t>atéliers</a:t>
+          </a:r>
+          <a:r>
+            <a:rPr lang="fr-FR" sz="1300" kern="1200" dirty="0" smtClean="0"/>
+            <a:t> qui ne communiquent pas</a:t>
           </a:r>
         </a:p>
         <a:p>
@@ -3973,24 +4064,7 @@
           </a:pPr>
           <a:r>
             <a:rPr lang="fr-FR" sz="1300" kern="1200" dirty="0" smtClean="0"/>
-            <a:t>Gestion des sociétés de maintenance</a:t>
-          </a:r>
-        </a:p>
-        <a:p>
-          <a:pPr lvl="0" algn="ctr" defTabSz="577850">
-            <a:lnSpc>
-              <a:spcPct val="90000"/>
-            </a:lnSpc>
-            <a:spcBef>
-              <a:spcPct val="0"/>
-            </a:spcBef>
-            <a:spcAft>
-              <a:spcPct val="35000"/>
-            </a:spcAft>
-          </a:pPr>
-          <a:r>
-            <a:rPr lang="fr-FR" sz="1300" kern="1200" dirty="0" smtClean="0"/>
-            <a:t>60 personnes  licenciées</a:t>
+            <a:t>Un stock de 10 M €</a:t>
           </a:r>
           <a:endParaRPr lang="en-US" sz="1300" kern="1200" dirty="0"/>
         </a:p>
@@ -4114,7 +4188,7 @@
           </a:pPr>
           <a:r>
             <a:rPr lang="fr-FR" sz="1300" kern="1200" dirty="0" smtClean="0"/>
-            <a:t>Améliorer la communication</a:t>
+            <a:t>Améliorer la planification d'affectation </a:t>
           </a:r>
         </a:p>
         <a:p>
@@ -4131,7 +4205,7 @@
           </a:pPr>
           <a:r>
             <a:rPr lang="fr-FR" sz="1300" kern="1200" dirty="0" smtClean="0"/>
-            <a:t>Plus d’autonomie pour les chantiers</a:t>
+            <a:t>Planification de la maintenance</a:t>
           </a:r>
         </a:p>
         <a:p>
@@ -4148,7 +4222,7 @@
           </a:pPr>
           <a:r>
             <a:rPr lang="fr-FR" sz="1300" kern="1200" dirty="0" smtClean="0"/>
-            <a:t>Superviser l’activité des chantiers</a:t>
+            <a:t>Planification des achats</a:t>
           </a:r>
         </a:p>
         <a:p>
@@ -4165,7 +4239,7 @@
           </a:pPr>
           <a:r>
             <a:rPr lang="fr-FR" sz="1300" kern="1200" dirty="0" smtClean="0"/>
-            <a:t>Augmenter l’efficacité du travail</a:t>
+            <a:t>Fournisseurs</a:t>
           </a:r>
           <a:endParaRPr lang="en-US" sz="1300" kern="1200" dirty="0"/>
         </a:p>
@@ -16333,7 +16407,7 @@
           <p:nvPr>
             <p:extLst>
               <p:ext uri="{D42A27DB-BD31-4B8C-83A1-F6EECF244321}">
-                <p14:modId xmlns:p14="http://schemas.microsoft.com/office/powerpoint/2010/main" val="2691516100"/>
+                <p14:modId xmlns:p14="http://schemas.microsoft.com/office/powerpoint/2010/main" val="1413343007"/>
               </p:ext>
             </p:extLst>
           </p:nvPr>

</xml_diff>

<commit_message>
correction fautes ortographe presentation
</commit_message>
<xml_diff>
--- a/rapports/presentation/presentationFinale.pptx
+++ b/rapports/presentation/presentationFinale.pptx
@@ -403,11 +403,11 @@
         </c:dLbls>
         <c:marker val="1"/>
         <c:smooth val="0"/>
-        <c:axId val="149895040"/>
-        <c:axId val="149896576"/>
+        <c:axId val="97674752"/>
+        <c:axId val="97676288"/>
       </c:lineChart>
       <c:catAx>
-        <c:axId val="149895040"/>
+        <c:axId val="97674752"/>
         <c:scaling>
           <c:orientation val="minMax"/>
         </c:scaling>
@@ -416,7 +416,7 @@
         <c:majorTickMark val="out"/>
         <c:minorTickMark val="none"/>
         <c:tickLblPos val="nextTo"/>
-        <c:crossAx val="149896576"/>
+        <c:crossAx val="97676288"/>
         <c:crosses val="autoZero"/>
         <c:auto val="1"/>
         <c:lblAlgn val="ctr"/>
@@ -424,7 +424,7 @@
         <c:noMultiLvlLbl val="0"/>
       </c:catAx>
       <c:valAx>
-        <c:axId val="149896576"/>
+        <c:axId val="97676288"/>
         <c:scaling>
           <c:orientation val="minMax"/>
         </c:scaling>
@@ -435,7 +435,7 @@
         <c:majorTickMark val="out"/>
         <c:minorTickMark val="none"/>
         <c:tickLblPos val="nextTo"/>
-        <c:crossAx val="149895040"/>
+        <c:crossAx val="97674752"/>
         <c:crosses val="autoZero"/>
         <c:crossBetween val="between"/>
       </c:valAx>
@@ -3101,7 +3101,7 @@
           </a:r>
           <a:r>
             <a:rPr lang="de-DE" dirty="0" err="1" smtClean="0"/>
-            <a:t>chèr</a:t>
+            <a:t>cher</a:t>
           </a:r>
           <a:endParaRPr lang="fr-FR" dirty="0" smtClean="0"/>
         </a:p>
@@ -3112,12 +3112,12 @@
             <a:t>40 </a:t>
           </a:r>
           <a:r>
-            <a:rPr lang="fr-FR" dirty="0" err="1" smtClean="0"/>
-            <a:t>atéliers</a:t>
+            <a:rPr lang="fr-FR" dirty="0" smtClean="0"/>
+            <a:t>ateliers </a:t>
           </a:r>
           <a:r>
             <a:rPr lang="fr-FR" dirty="0" smtClean="0"/>
-            <a:t> qui ne communiquent pas</a:t>
+            <a:t>qui ne communiquent pas</a:t>
           </a:r>
         </a:p>
         <a:p>
@@ -3300,12 +3300,12 @@
     </dgm:pt>
   </dgm:ptLst>
   <dgm:cxnLst>
-    <dgm:cxn modelId="{B8755B93-FDE7-4C63-9314-7EB09E2F4513}" type="presOf" srcId="{563608C0-AC27-45C2-9ED5-F9E6BA70AC3F}" destId="{79C67CC8-935B-405B-B2FF-82C277024EE4}" srcOrd="0" destOrd="0" presId="urn:microsoft.com/office/officeart/2008/layout/VerticalCurvedList"/>
-    <dgm:cxn modelId="{316A9A8A-3FF5-4D3E-8895-384868921F3E}" type="presOf" srcId="{819A4488-4A79-47B1-A9E5-2DB9C1F7468C}" destId="{D2D09B6D-330A-4671-908F-F4FA5B217D73}" srcOrd="0" destOrd="0" presId="urn:microsoft.com/office/officeart/2008/layout/VerticalCurvedList"/>
-    <dgm:cxn modelId="{100FEA02-CA2A-4B0E-838D-CCCE2B810B5C}" srcId="{4DC7D8B7-8F24-4007-90AC-52F37569343B}" destId="{819A4488-4A79-47B1-A9E5-2DB9C1F7468C}" srcOrd="0" destOrd="0" parTransId="{8932B3CF-DA08-4EED-88A4-55E21960DE08}" sibTransId="{2D35B78B-1D09-465A-AB68-2C1FF1A2AEA0}"/>
-    <dgm:cxn modelId="{41302258-B789-4D93-8539-B75CCC248221}" type="presOf" srcId="{2D35B78B-1D09-465A-AB68-2C1FF1A2AEA0}" destId="{B2C9D143-B324-4039-B99E-569AFEFA2017}" srcOrd="0" destOrd="0" presId="urn:microsoft.com/office/officeart/2008/layout/VerticalCurvedList"/>
     <dgm:cxn modelId="{C2C1A14A-6277-4772-9F66-283C63F44CE0}" srcId="{4DC7D8B7-8F24-4007-90AC-52F37569343B}" destId="{563608C0-AC27-45C2-9ED5-F9E6BA70AC3F}" srcOrd="1" destOrd="0" parTransId="{330CF5AE-F392-40AE-81C2-239BF868C6CE}" sibTransId="{6BFD8C6F-CF47-4100-A47C-DF47978C8B10}"/>
     <dgm:cxn modelId="{9475D457-62EF-41CA-B0DE-9C3260B6F82F}" type="presOf" srcId="{4DC7D8B7-8F24-4007-90AC-52F37569343B}" destId="{7678921B-E37C-41A4-8070-5287F882EB14}" srcOrd="0" destOrd="0" presId="urn:microsoft.com/office/officeart/2008/layout/VerticalCurvedList"/>
+    <dgm:cxn modelId="{100FEA02-CA2A-4B0E-838D-CCCE2B810B5C}" srcId="{4DC7D8B7-8F24-4007-90AC-52F37569343B}" destId="{819A4488-4A79-47B1-A9E5-2DB9C1F7468C}" srcOrd="0" destOrd="0" parTransId="{8932B3CF-DA08-4EED-88A4-55E21960DE08}" sibTransId="{2D35B78B-1D09-465A-AB68-2C1FF1A2AEA0}"/>
+    <dgm:cxn modelId="{316A9A8A-3FF5-4D3E-8895-384868921F3E}" type="presOf" srcId="{819A4488-4A79-47B1-A9E5-2DB9C1F7468C}" destId="{D2D09B6D-330A-4671-908F-F4FA5B217D73}" srcOrd="0" destOrd="0" presId="urn:microsoft.com/office/officeart/2008/layout/VerticalCurvedList"/>
+    <dgm:cxn modelId="{B8755B93-FDE7-4C63-9314-7EB09E2F4513}" type="presOf" srcId="{563608C0-AC27-45C2-9ED5-F9E6BA70AC3F}" destId="{79C67CC8-935B-405B-B2FF-82C277024EE4}" srcOrd="0" destOrd="0" presId="urn:microsoft.com/office/officeart/2008/layout/VerticalCurvedList"/>
+    <dgm:cxn modelId="{41302258-B789-4D93-8539-B75CCC248221}" type="presOf" srcId="{2D35B78B-1D09-465A-AB68-2C1FF1A2AEA0}" destId="{B2C9D143-B324-4039-B99E-569AFEFA2017}" srcOrd="0" destOrd="0" presId="urn:microsoft.com/office/officeart/2008/layout/VerticalCurvedList"/>
     <dgm:cxn modelId="{1A14BCD9-FF01-4A6F-8B9D-E8C9D0F9350A}" type="presParOf" srcId="{7678921B-E37C-41A4-8070-5287F882EB14}" destId="{DF15B877-2090-4411-A486-AA79D482FA32}" srcOrd="0" destOrd="0" presId="urn:microsoft.com/office/officeart/2008/layout/VerticalCurvedList"/>
     <dgm:cxn modelId="{DCBBD040-FF56-45CA-9519-903BCB15E916}" type="presParOf" srcId="{DF15B877-2090-4411-A486-AA79D482FA32}" destId="{7F99B7A4-49FA-4468-9DE1-D3A6FD2E7E72}" srcOrd="0" destOrd="0" presId="urn:microsoft.com/office/officeart/2008/layout/VerticalCurvedList"/>
     <dgm:cxn modelId="{68A01BEB-C194-441A-B73C-AA5D2DA69572}" type="presParOf" srcId="{7F99B7A4-49FA-4468-9DE1-D3A6FD2E7E72}" destId="{B74844D7-5E03-4899-B2C7-8F74FEAC98DA}" srcOrd="0" destOrd="0" presId="urn:microsoft.com/office/officeart/2008/layout/VerticalCurvedList"/>
@@ -4021,7 +4021,7 @@
           </a:r>
           <a:r>
             <a:rPr lang="de-DE" sz="1300" kern="1200" dirty="0" err="1" smtClean="0"/>
-            <a:t>chèr</a:t>
+            <a:t>cher</a:t>
           </a:r>
           <a:endParaRPr lang="fr-FR" sz="1300" kern="1200" dirty="0" smtClean="0"/>
         </a:p>
@@ -4042,12 +4042,12 @@
             <a:t>40 </a:t>
           </a:r>
           <a:r>
-            <a:rPr lang="fr-FR" sz="1300" kern="1200" dirty="0" err="1" smtClean="0"/>
-            <a:t>atéliers</a:t>
+            <a:rPr lang="fr-FR" sz="1300" kern="1200" dirty="0" smtClean="0"/>
+            <a:t>ateliers </a:t>
           </a:r>
           <a:r>
             <a:rPr lang="fr-FR" sz="1300" kern="1200" dirty="0" smtClean="0"/>
-            <a:t> qui ne communiquent pas</a:t>
+            <a:t>qui ne communiquent pas</a:t>
           </a:r>
         </a:p>
         <a:p>
@@ -11553,7 +11553,7 @@
           <a:p>
             <a:fld id="{400F49D6-3A4B-4F61-84E8-BB4162510001}" type="datetimeFigureOut">
               <a:rPr lang="en-US" smtClean="0"/>
-              <a:t>3/8/2011</a:t>
+              <a:t>3/9/2011</a:t>
             </a:fld>
             <a:endParaRPr lang="en-US"/>
           </a:p>
@@ -11723,7 +11723,7 @@
           <a:p>
             <a:fld id="{5CCA9A7B-FF2E-404C-9E2E-365E79DC1EBA}" type="datetimeFigureOut">
               <a:rPr lang="en-US" smtClean="0"/>
-              <a:t>3/8/2011</a:t>
+              <a:t>3/9/2011</a:t>
             </a:fld>
             <a:endParaRPr lang="en-US"/>
           </a:p>
@@ -12507,9 +12507,9 @@
           <a:bodyPr/>
           <a:lstStyle/>
           <a:p>
-            <a:fld id="{F826ED46-E479-49BD-B49A-4DE005A5BB04}" type="datetime1">
+            <a:fld id="{05773324-F51C-4FEE-95C3-F2813BDEC692}" type="datetime1">
               <a:rPr lang="en-US" smtClean="0"/>
-              <a:t>3/8/2011</a:t>
+              <a:t>3/9/2011</a:t>
             </a:fld>
             <a:endParaRPr lang="en-US"/>
           </a:p>
@@ -12532,7 +12532,7 @@
           <a:p>
             <a:r>
               <a:rPr lang="fr-FR" smtClean="0"/>
-              <a:t>H4312 - Conception de Systéme d'Information</a:t>
+              <a:t>H4312 - Conception de Système d'Information</a:t>
             </a:r>
             <a:endParaRPr lang="en-US"/>
           </a:p>
@@ -12681,9 +12681,9 @@
           <a:bodyPr/>
           <a:lstStyle/>
           <a:p>
-            <a:fld id="{508732B3-54A5-424D-9C27-70471EA152EC}" type="datetime1">
+            <a:fld id="{9C078F79-7723-4342-8DF5-E0A59106CFB5}" type="datetime1">
               <a:rPr lang="en-US" smtClean="0"/>
-              <a:t>3/8/2011</a:t>
+              <a:t>3/9/2011</a:t>
             </a:fld>
             <a:endParaRPr lang="en-US"/>
           </a:p>
@@ -12706,7 +12706,7 @@
           <a:p>
             <a:r>
               <a:rPr lang="fr-FR" smtClean="0"/>
-              <a:t>H4312 - Conception de Systéme d'Information</a:t>
+              <a:t>H4312 - Conception de Système d'Information</a:t>
             </a:r>
             <a:endParaRPr lang="en-US"/>
           </a:p>
@@ -12865,9 +12865,9 @@
           <a:bodyPr/>
           <a:lstStyle/>
           <a:p>
-            <a:fld id="{6FF5E195-2DF3-4F45-9F60-5BD701E10733}" type="datetime1">
+            <a:fld id="{75B5D72B-4F05-4E21-A4FE-8C5D724FB0BB}" type="datetime1">
               <a:rPr lang="en-US" smtClean="0"/>
-              <a:t>3/8/2011</a:t>
+              <a:t>3/9/2011</a:t>
             </a:fld>
             <a:endParaRPr lang="en-US"/>
           </a:p>
@@ -12890,7 +12890,7 @@
           <a:p>
             <a:r>
               <a:rPr lang="fr-FR" smtClean="0"/>
-              <a:t>H4312 - Conception de Systéme d'Information</a:t>
+              <a:t>H4312 - Conception de Système d'Information</a:t>
             </a:r>
             <a:endParaRPr lang="en-US"/>
           </a:p>
@@ -13039,9 +13039,9 @@
           <a:bodyPr/>
           <a:lstStyle/>
           <a:p>
-            <a:fld id="{D8A18AB3-B1EE-4AE0-9A51-E45595FEF524}" type="datetime1">
+            <a:fld id="{577EF1F7-D654-46FA-A314-27C1B06C9631}" type="datetime1">
               <a:rPr lang="en-US" smtClean="0"/>
-              <a:t>3/8/2011</a:t>
+              <a:t>3/9/2011</a:t>
             </a:fld>
             <a:endParaRPr lang="en-US"/>
           </a:p>
@@ -13064,7 +13064,7 @@
           <a:p>
             <a:r>
               <a:rPr lang="fr-FR" smtClean="0"/>
-              <a:t>H4312 - Conception de Systéme d'Information</a:t>
+              <a:t>H4312 - Conception de Système d'Information</a:t>
             </a:r>
             <a:endParaRPr lang="en-US"/>
           </a:p>
@@ -13289,9 +13289,9 @@
           <a:bodyPr/>
           <a:lstStyle/>
           <a:p>
-            <a:fld id="{8325E540-A141-4CA0-93CA-DAFA96764520}" type="datetime1">
+            <a:fld id="{4C9AC74B-AC46-4F5B-AEFE-3A2A9AD6DAFE}" type="datetime1">
               <a:rPr lang="en-US" smtClean="0"/>
-              <a:t>3/8/2011</a:t>
+              <a:t>3/9/2011</a:t>
             </a:fld>
             <a:endParaRPr lang="en-US"/>
           </a:p>
@@ -13314,7 +13314,7 @@
           <a:p>
             <a:r>
               <a:rPr lang="fr-FR" smtClean="0"/>
-              <a:t>H4312 - Conception de Systéme d'Information</a:t>
+              <a:t>H4312 - Conception de Système d'Information</a:t>
             </a:r>
             <a:endParaRPr lang="en-US"/>
           </a:p>
@@ -13581,9 +13581,9 @@
           <a:bodyPr/>
           <a:lstStyle/>
           <a:p>
-            <a:fld id="{89FB1EFE-FF1B-46C8-835B-E33FFC48654E}" type="datetime1">
+            <a:fld id="{3C3C992A-7343-477A-ACB7-E58134A56620}" type="datetime1">
               <a:rPr lang="en-US" smtClean="0"/>
-              <a:t>3/8/2011</a:t>
+              <a:t>3/9/2011</a:t>
             </a:fld>
             <a:endParaRPr lang="en-US"/>
           </a:p>
@@ -13606,7 +13606,7 @@
           <a:p>
             <a:r>
               <a:rPr lang="fr-FR" smtClean="0"/>
-              <a:t>H4312 - Conception de Systéme d'Information</a:t>
+              <a:t>H4312 - Conception de Système d'Information</a:t>
             </a:r>
             <a:endParaRPr lang="en-US"/>
           </a:p>
@@ -14007,9 +14007,9 @@
           <a:bodyPr/>
           <a:lstStyle/>
           <a:p>
-            <a:fld id="{D0A3467F-C47B-440E-86E6-0FB785AD624E}" type="datetime1">
+            <a:fld id="{CD3E9D1F-D1B3-4E4D-8A9B-F1A8C939D3B7}" type="datetime1">
               <a:rPr lang="en-US" smtClean="0"/>
-              <a:t>3/8/2011</a:t>
+              <a:t>3/9/2011</a:t>
             </a:fld>
             <a:endParaRPr lang="en-US"/>
           </a:p>
@@ -14032,7 +14032,7 @@
           <a:p>
             <a:r>
               <a:rPr lang="fr-FR" smtClean="0"/>
-              <a:t>H4312 - Conception de Systéme d'Information</a:t>
+              <a:t>H4312 - Conception de Système d'Information</a:t>
             </a:r>
             <a:endParaRPr lang="en-US"/>
           </a:p>
@@ -14129,9 +14129,9 @@
           <a:bodyPr/>
           <a:lstStyle/>
           <a:p>
-            <a:fld id="{457F96D8-9933-413C-92EA-EE7EF5CCB635}" type="datetime1">
+            <a:fld id="{3200B597-5EB8-4C03-A4AB-D7E7AD053C6E}" type="datetime1">
               <a:rPr lang="en-US" smtClean="0"/>
-              <a:t>3/8/2011</a:t>
+              <a:t>3/9/2011</a:t>
             </a:fld>
             <a:endParaRPr lang="en-US"/>
           </a:p>
@@ -14154,7 +14154,7 @@
           <a:p>
             <a:r>
               <a:rPr lang="fr-FR" smtClean="0"/>
-              <a:t>H4312 - Conception de Systéme d'Information</a:t>
+              <a:t>H4312 - Conception de Système d'Information</a:t>
             </a:r>
             <a:endParaRPr lang="en-US"/>
           </a:p>
@@ -14228,9 +14228,9 @@
           <a:bodyPr/>
           <a:lstStyle/>
           <a:p>
-            <a:fld id="{537B277E-D6F4-419B-976E-EA9E97BA8B49}" type="datetime1">
+            <a:fld id="{ABDB90BC-75EC-481B-90F8-43D523A9D564}" type="datetime1">
               <a:rPr lang="en-US" smtClean="0"/>
-              <a:t>3/8/2011</a:t>
+              <a:t>3/9/2011</a:t>
             </a:fld>
             <a:endParaRPr lang="en-US"/>
           </a:p>
@@ -14253,7 +14253,7 @@
           <a:p>
             <a:r>
               <a:rPr lang="fr-FR" smtClean="0"/>
-              <a:t>H4312 - Conception de Systéme d'Information</a:t>
+              <a:t>H4312 - Conception de Système d'Information</a:t>
             </a:r>
             <a:endParaRPr lang="en-US"/>
           </a:p>
@@ -14509,9 +14509,9 @@
           <a:bodyPr/>
           <a:lstStyle/>
           <a:p>
-            <a:fld id="{E9B3AAA6-9DEC-4A7E-82BA-7A84B1A8DED6}" type="datetime1">
+            <a:fld id="{2403C78B-2398-46AD-A4AC-90E0935ADAE0}" type="datetime1">
               <a:rPr lang="en-US" smtClean="0"/>
-              <a:t>3/8/2011</a:t>
+              <a:t>3/9/2011</a:t>
             </a:fld>
             <a:endParaRPr lang="en-US"/>
           </a:p>
@@ -14534,7 +14534,7 @@
           <a:p>
             <a:r>
               <a:rPr lang="fr-FR" smtClean="0"/>
-              <a:t>H4312 - Conception de Systéme d'Information</a:t>
+              <a:t>H4312 - Conception de Système d'Information</a:t>
             </a:r>
             <a:endParaRPr lang="en-US"/>
           </a:p>
@@ -14766,9 +14766,9 @@
           <a:bodyPr/>
           <a:lstStyle/>
           <a:p>
-            <a:fld id="{8E685C9A-A9B2-405F-A1F6-7849CBFD2AC3}" type="datetime1">
+            <a:fld id="{4C2B901D-CD15-47F5-81C3-23F95CE6D396}" type="datetime1">
               <a:rPr lang="en-US" smtClean="0"/>
-              <a:t>3/8/2011</a:t>
+              <a:t>3/9/2011</a:t>
             </a:fld>
             <a:endParaRPr lang="en-US"/>
           </a:p>
@@ -14791,7 +14791,7 @@
           <a:p>
             <a:r>
               <a:rPr lang="fr-FR" smtClean="0"/>
-              <a:t>H4312 - Conception de Systéme d'Information</a:t>
+              <a:t>H4312 - Conception de Système d'Information</a:t>
             </a:r>
             <a:endParaRPr lang="en-US"/>
           </a:p>
@@ -14983,9 +14983,9 @@
             </a:lvl1pPr>
           </a:lstStyle>
           <a:p>
-            <a:fld id="{6859F451-EAAE-4C03-A11A-552DF9C2A7AC}" type="datetime1">
+            <a:fld id="{C24EB04A-6A76-4FF2-B1B3-CA1D0543E50A}" type="datetime1">
               <a:rPr lang="en-US" smtClean="0"/>
-              <a:t>3/8/2011</a:t>
+              <a:t>3/9/2011</a:t>
             </a:fld>
             <a:endParaRPr lang="en-US"/>
           </a:p>
@@ -15026,7 +15026,7 @@
           <a:p>
             <a:r>
               <a:rPr lang="fr-FR" smtClean="0"/>
-              <a:t>H4312 - Conception de Systéme d'Information</a:t>
+              <a:t>H4312 - Conception de Système d'Information</a:t>
             </a:r>
             <a:endParaRPr lang="en-US"/>
           </a:p>
@@ -15389,7 +15389,23 @@
           <a:p>
             <a:r>
               <a:rPr lang="en-US" sz="3600" dirty="0" smtClean="0"/>
-              <a:t>CONCEPTION ET INTEGRATION DE SYSTEME D’INFORMATION</a:t>
+              <a:t>CONCEPTION ET INTEGRATION DE </a:t>
+            </a:r>
+            <a:r>
+              <a:rPr lang="en-US" sz="3600" dirty="0" smtClean="0"/>
+              <a:t>SYST</a:t>
+            </a:r>
+            <a:r>
+              <a:rPr lang="de-DE" sz="3600" dirty="0"/>
+              <a:t>È</a:t>
+            </a:r>
+            <a:r>
+              <a:rPr lang="en-US" sz="3600" dirty="0" smtClean="0"/>
+              <a:t>ME </a:t>
+            </a:r>
+            <a:r>
+              <a:rPr lang="en-US" sz="3600" dirty="0" smtClean="0"/>
+              <a:t>D’INFORMATION</a:t>
             </a:r>
             <a:endParaRPr lang="en-US" sz="3600" dirty="0"/>
           </a:p>
@@ -15642,7 +15658,7 @@
           <a:p>
             <a:r>
               <a:rPr lang="fr-FR" smtClean="0"/>
-              <a:t>H4312 - Conception de Systéme d'Information</a:t>
+              <a:t>H4312 - Conception de Système d'Information</a:t>
             </a:r>
             <a:endParaRPr lang="en-US"/>
           </a:p>
@@ -15971,7 +15987,7 @@
           <a:p>
             <a:r>
               <a:rPr lang="fr-FR" smtClean="0"/>
-              <a:t>H4312 - Conception de Systéme d'Information</a:t>
+              <a:t>H4312 - Conception de Système d'Information</a:t>
             </a:r>
             <a:endParaRPr lang="en-US"/>
           </a:p>
@@ -16278,7 +16294,7 @@
           <a:p>
             <a:r>
               <a:rPr lang="fr-FR" smtClean="0"/>
-              <a:t>H4312 - Conception de Systéme d'Information</a:t>
+              <a:t>H4312 - Conception de Système d'Information</a:t>
             </a:r>
             <a:endParaRPr lang="en-US"/>
           </a:p>
@@ -16407,7 +16423,7 @@
           <p:nvPr>
             <p:extLst>
               <p:ext uri="{D42A27DB-BD31-4B8C-83A1-F6EECF244321}">
-                <p14:modId xmlns:p14="http://schemas.microsoft.com/office/powerpoint/2010/main" val="1413343007"/>
+                <p14:modId xmlns:p14="http://schemas.microsoft.com/office/powerpoint/2010/main" val="2318897463"/>
               </p:ext>
             </p:extLst>
           </p:nvPr>
@@ -16602,7 +16618,7 @@
           <a:p>
             <a:r>
               <a:rPr lang="fr-FR" smtClean="0"/>
-              <a:t>H4312 - Conception de Systéme d'Information</a:t>
+              <a:t>H4312 - Conception de Système d'Information</a:t>
             </a:r>
             <a:endParaRPr lang="en-US"/>
           </a:p>
@@ -16827,7 +16843,7 @@
           <a:p>
             <a:r>
               <a:rPr lang="fr-FR" smtClean="0"/>
-              <a:t>H4312 - Conception de Systéme d'Information</a:t>
+              <a:t>H4312 - Conception de Système d'Information</a:t>
             </a:r>
             <a:endParaRPr lang="en-US"/>
           </a:p>
@@ -16954,7 +16970,7 @@
           <a:p>
             <a:r>
               <a:rPr lang="fr-FR" smtClean="0"/>
-              <a:t>H4312 - Conception de Systéme d'Information</a:t>
+              <a:t>H4312 - Conception de Système d'Information</a:t>
             </a:r>
             <a:endParaRPr lang="en-US"/>
           </a:p>
@@ -17760,7 +17776,7 @@
           <a:p>
             <a:r>
               <a:rPr lang="fr-FR" smtClean="0"/>
-              <a:t>H4312 - Conception de Systéme d'Information</a:t>
+              <a:t>H4312 - Conception de Système d'Information</a:t>
             </a:r>
             <a:endParaRPr lang="en-US"/>
           </a:p>
@@ -18384,7 +18400,7 @@
           <a:p>
             <a:r>
               <a:rPr lang="fr-FR" smtClean="0"/>
-              <a:t>H4312 - Conception de Systéme d'Information</a:t>
+              <a:t>H4312 - Conception de Système d'Information</a:t>
             </a:r>
             <a:endParaRPr lang="en-US"/>
           </a:p>
@@ -19008,7 +19024,7 @@
           <a:p>
             <a:r>
               <a:rPr lang="fr-FR" smtClean="0"/>
-              <a:t>H4312 - Conception de Systéme d'Information</a:t>
+              <a:t>H4312 - Conception de Système d'Information</a:t>
             </a:r>
             <a:endParaRPr lang="en-US"/>
           </a:p>
@@ -19625,7 +19641,7 @@
           <a:p>
             <a:r>
               <a:rPr lang="fr-FR" smtClean="0"/>
-              <a:t>H4312 - Conception de Systéme d'Information</a:t>
+              <a:t>H4312 - Conception de Système d'Information</a:t>
             </a:r>
             <a:endParaRPr lang="en-US"/>
           </a:p>
@@ -19751,16 +19767,8 @@
           <a:lstStyle/>
           <a:p>
             <a:r>
-              <a:rPr lang="fr-FR" dirty="0" smtClean="0"/>
-              <a:t>H4312 - Conception de </a:t>
-            </a:r>
-            <a:r>
-              <a:rPr lang="fr-FR" dirty="0" err="1" smtClean="0"/>
-              <a:t>Systéme</a:t>
-            </a:r>
-            <a:r>
-              <a:rPr lang="fr-FR" dirty="0" smtClean="0"/>
-              <a:t> d'Information</a:t>
+              <a:rPr lang="fr-FR" smtClean="0"/>
+              <a:t>H4312 - Conception de Système d'Information</a:t>
             </a:r>
             <a:endParaRPr lang="en-US" dirty="0"/>
           </a:p>
@@ -20197,7 +20205,7 @@
           <a:p>
             <a:r>
               <a:rPr lang="fr-FR" smtClean="0"/>
-              <a:t>H4312 - Conception de Systéme d'Information</a:t>
+              <a:t>H4312 - Conception de Système d'Information</a:t>
             </a:r>
             <a:endParaRPr lang="en-US"/>
           </a:p>
@@ -20685,7 +20693,7 @@
           <a:p>
             <a:r>
               <a:rPr lang="fr-FR" smtClean="0"/>
-              <a:t>H4312 - Conception de Systéme d'Information</a:t>
+              <a:t>H4312 - Conception de Système d'Information</a:t>
             </a:r>
             <a:endParaRPr lang="en-US"/>
           </a:p>
@@ -20891,7 +20899,7 @@
         <p:spPr bwMode="auto">
           <a:xfrm>
             <a:off x="697869" y="228600"/>
-            <a:ext cx="7607931" cy="762000"/>
+            <a:ext cx="7988931" cy="762000"/>
           </a:xfrm>
           <a:prstGeom prst="rect">
             <a:avLst/>
@@ -21066,7 +21074,18 @@
                 <a:ea typeface="+mn-ea"/>
                 <a:cs typeface="+mn-cs"/>
               </a:rPr>
-              <a:t>On a appliqué la démarche SAP suivante</a:t>
+              <a:t>Nous avons appliqué </a:t>
+            </a:r>
+            <a:r>
+              <a:rPr lang="fr-FR" sz="3200" dirty="0" smtClean="0">
+                <a:solidFill>
+                  <a:schemeClr val="tx2"/>
+                </a:solidFill>
+                <a:latin typeface="+mn-lt"/>
+                <a:ea typeface="+mn-ea"/>
+                <a:cs typeface="+mn-cs"/>
+              </a:rPr>
+              <a:t>la démarche SAP suivante</a:t>
             </a:r>
             <a:endParaRPr lang="fr-FR" sz="3200" dirty="0">
               <a:solidFill>
@@ -21289,7 +21308,7 @@
           <a:p>
             <a:r>
               <a:rPr lang="fr-FR" smtClean="0"/>
-              <a:t>H4312 - Conception de Systéme d'Information</a:t>
+              <a:t>H4312 - Conception de Système d'Information</a:t>
             </a:r>
             <a:endParaRPr lang="en-US"/>
           </a:p>
@@ -21562,7 +21581,18 @@
                 <a:ea typeface="+mn-ea"/>
                 <a:cs typeface="+mn-cs"/>
               </a:rPr>
-              <a:t>Exemple type d’un scenario </a:t>
+              <a:t>Exemple type d’un </a:t>
+            </a:r>
+            <a:r>
+              <a:rPr lang="fr-FR" sz="3200" dirty="0" smtClean="0">
+                <a:solidFill>
+                  <a:schemeClr val="tx2"/>
+                </a:solidFill>
+                <a:latin typeface="+mn-lt"/>
+                <a:ea typeface="+mn-ea"/>
+                <a:cs typeface="+mn-cs"/>
+              </a:rPr>
+              <a:t>scénario </a:t>
             </a:r>
             <a:r>
               <a:rPr lang="fr-FR" sz="3200" dirty="0" smtClean="0">
@@ -21796,7 +21826,7 @@
           <a:p>
             <a:r>
               <a:rPr lang="fr-FR" smtClean="0"/>
-              <a:t>H4312 - Conception de Systéme d'Information</a:t>
+              <a:t>H4312 - Conception de Système d'Information</a:t>
             </a:r>
             <a:endParaRPr lang="en-US"/>
           </a:p>
@@ -22297,7 +22327,7 @@
           <a:p>
             <a:r>
               <a:rPr lang="fr-FR" smtClean="0"/>
-              <a:t>H4312 - Conception de Systéme d'Information</a:t>
+              <a:t>H4312 - Conception de Système d'Information</a:t>
             </a:r>
             <a:endParaRPr lang="en-US"/>
           </a:p>
@@ -22804,7 +22834,7 @@
           <a:p>
             <a:r>
               <a:rPr lang="fr-FR" smtClean="0"/>
-              <a:t>H4312 - Conception de Systéme d'Information</a:t>
+              <a:t>H4312 - Conception de Système d'Information</a:t>
             </a:r>
             <a:endParaRPr lang="en-US"/>
           </a:p>
@@ -23300,7 +23330,7 @@
           <a:p>
             <a:r>
               <a:rPr lang="fr-FR" smtClean="0"/>
-              <a:t>H4312 - Conception de Systéme d'Information</a:t>
+              <a:t>H4312 - Conception de Système d'Information</a:t>
             </a:r>
             <a:endParaRPr lang="en-US"/>
           </a:p>
@@ -23796,7 +23826,7 @@
           <a:p>
             <a:r>
               <a:rPr lang="fr-FR" smtClean="0"/>
-              <a:t>H4312 - Conception de Systéme d'Information</a:t>
+              <a:t>H4312 - Conception de Système d'Information</a:t>
             </a:r>
             <a:endParaRPr lang="en-US"/>
           </a:p>
@@ -23925,7 +23955,7 @@
           <a:p>
             <a:r>
               <a:rPr lang="fr-FR" smtClean="0"/>
-              <a:t>H4312 - Conception de Systéme d'Information</a:t>
+              <a:t>H4312 - Conception de Système d'Information</a:t>
             </a:r>
             <a:endParaRPr lang="en-US"/>
           </a:p>
@@ -24936,7 +24966,7 @@
           <a:p>
             <a:r>
               <a:rPr lang="fr-FR" smtClean="0"/>
-              <a:t>H4312 - Conception de Systéme d'Information</a:t>
+              <a:t>H4312 - Conception de Système d'Information</a:t>
             </a:r>
             <a:endParaRPr lang="en-US"/>
           </a:p>
@@ -25972,7 +26002,7 @@
           <a:p>
             <a:r>
               <a:rPr lang="fr-FR" smtClean="0"/>
-              <a:t>H4312 - Conception de Systéme d'Information</a:t>
+              <a:t>H4312 - Conception de Système d'Information</a:t>
             </a:r>
             <a:endParaRPr lang="en-US"/>
           </a:p>
@@ -26215,7 +26245,7 @@
           <a:p>
             <a:r>
               <a:rPr lang="fr-FR" smtClean="0"/>
-              <a:t>H4312 - Conception de Systéme d'Information</a:t>
+              <a:t>H4312 - Conception de Système d'Information</a:t>
             </a:r>
             <a:endParaRPr lang="en-US"/>
           </a:p>
@@ -26984,7 +27014,7 @@
           <a:p>
             <a:r>
               <a:rPr lang="fr-FR" smtClean="0"/>
-              <a:t>H4312 - Conception de Systéme d'Information</a:t>
+              <a:t>H4312 - Conception de Système d'Information</a:t>
             </a:r>
             <a:endParaRPr lang="en-US"/>
           </a:p>
@@ -27651,7 +27681,7 @@
           <a:p>
             <a:r>
               <a:rPr lang="fr-FR" smtClean="0"/>
-              <a:t>H4312 - Conception de Systéme d'Information</a:t>
+              <a:t>H4312 - Conception de Système d'Information</a:t>
             </a:r>
             <a:endParaRPr lang="en-US"/>
           </a:p>
@@ -28612,7 +28642,7 @@
           <a:p>
             <a:r>
               <a:rPr lang="fr-FR" smtClean="0"/>
-              <a:t>H4312 - Conception de Systéme d'Information</a:t>
+              <a:t>H4312 - Conception de Système d'Information</a:t>
             </a:r>
             <a:endParaRPr lang="en-US"/>
           </a:p>
@@ -28741,7 +28771,7 @@
           <a:p>
             <a:r>
               <a:rPr lang="fr-FR" smtClean="0"/>
-              <a:t>H4312 - Conception de Systéme d'Information</a:t>
+              <a:t>H4312 - Conception de Système d'Information</a:t>
             </a:r>
             <a:endParaRPr lang="en-US"/>
           </a:p>
@@ -29555,7 +29585,7 @@
           <a:p>
             <a:r>
               <a:rPr lang="fr-FR" smtClean="0"/>
-              <a:t>H4312 - Conception de Systéme d'Information</a:t>
+              <a:t>H4312 - Conception de Système d'Information</a:t>
             </a:r>
             <a:endParaRPr lang="en-US"/>
           </a:p>
@@ -30444,7 +30474,7 @@
           <a:p>
             <a:r>
               <a:rPr lang="fr-FR" smtClean="0"/>
-              <a:t>H4312 - Conception de Systéme d'Information</a:t>
+              <a:t>H4312 - Conception de Système d'Information</a:t>
             </a:r>
             <a:endParaRPr lang="en-US"/>
           </a:p>
@@ -30560,16 +30590,8 @@
           <a:lstStyle/>
           <a:p>
             <a:r>
-              <a:rPr lang="fr-FR" dirty="0" smtClean="0"/>
-              <a:t>H4312 - Conception de </a:t>
-            </a:r>
-            <a:r>
-              <a:rPr lang="fr-FR" dirty="0" err="1" smtClean="0"/>
-              <a:t>Systéme</a:t>
-            </a:r>
-            <a:r>
-              <a:rPr lang="fr-FR" dirty="0" smtClean="0"/>
-              <a:t> d'Information</a:t>
+              <a:rPr lang="fr-FR" smtClean="0"/>
+              <a:t>H4312 - Conception de Système d'Information</a:t>
             </a:r>
             <a:endParaRPr lang="en-US" dirty="0"/>
           </a:p>
@@ -30630,15 +30652,23 @@
                   <a:schemeClr val="tx2"/>
                 </a:solidFill>
               </a:rPr>
-              <a:t>L‘étude de l‘</a:t>
-            </a:r>
-            <a:r>
-              <a:rPr lang="fr-FR" sz="3200" dirty="0" err="1" smtClean="0">
+              <a:t>L‘étude de </a:t>
+            </a:r>
+            <a:r>
+              <a:rPr lang="fr-FR" sz="3200" dirty="0" smtClean="0">
                 <a:solidFill>
                   <a:schemeClr val="tx2"/>
                 </a:solidFill>
               </a:rPr>
-              <a:t>éxistant</a:t>
+              <a:t>l‘</a:t>
+            </a:r>
+            <a:r>
+              <a:rPr lang="fr-FR" sz="3200" dirty="0">
+                <a:solidFill>
+                  <a:schemeClr val="tx2"/>
+                </a:solidFill>
+              </a:rPr>
+              <a:t>e</a:t>
             </a:r>
             <a:r>
               <a:rPr lang="fr-FR" sz="3200" dirty="0" smtClean="0">
@@ -30646,7 +30676,15 @@
                   <a:schemeClr val="tx2"/>
                 </a:solidFill>
               </a:rPr>
-              <a:t> a relevé plusieurs faiblesses</a:t>
+              <a:t>xistant </a:t>
+            </a:r>
+            <a:r>
+              <a:rPr lang="fr-FR" sz="3200" dirty="0" smtClean="0">
+                <a:solidFill>
+                  <a:schemeClr val="tx2"/>
+                </a:solidFill>
+              </a:rPr>
+              <a:t>a relevé plusieurs faiblesses</a:t>
             </a:r>
             <a:endParaRPr lang="fr-FR" sz="3200" dirty="0">
               <a:solidFill>
@@ -30981,7 +31019,7 @@
           <a:p>
             <a:r>
               <a:rPr lang="fr-FR" smtClean="0"/>
-              <a:t>H4312 - Conception de Systéme d'Information</a:t>
+              <a:t>H4312 - Conception de Système d'Information</a:t>
             </a:r>
             <a:endParaRPr lang="en-US"/>
           </a:p>
@@ -31516,7 +31554,7 @@
           <a:p>
             <a:r>
               <a:rPr lang="fr-FR" smtClean="0"/>
-              <a:t>H4312 - Conception de Systéme d'Information</a:t>
+              <a:t>H4312 - Conception de Système d'Information</a:t>
             </a:r>
             <a:endParaRPr lang="en-US"/>
           </a:p>
@@ -31959,7 +31997,7 @@
           <a:p>
             <a:r>
               <a:rPr lang="fr-FR" smtClean="0"/>
-              <a:t>H4312 - Conception de Systéme d'Information</a:t>
+              <a:t>H4312 - Conception de Système d'Information</a:t>
             </a:r>
             <a:endParaRPr lang="en-US"/>
           </a:p>
@@ -32442,7 +32480,7 @@
           <a:p>
             <a:r>
               <a:rPr lang="fr-FR" smtClean="0"/>
-              <a:t>H4312 - Conception de Systéme d'Information</a:t>
+              <a:t>H4312 - Conception de Système d'Information</a:t>
             </a:r>
             <a:endParaRPr lang="en-US"/>
           </a:p>

</xml_diff>

<commit_message>
gestion projet et corrections tableau et texte soraya
</commit_message>
<xml_diff>
--- a/rapports/presentation/presentationFinale.pptx
+++ b/rapports/presentation/presentationFinale.pptx
@@ -3072,36 +3072,24 @@
         <a:p>
           <a:pPr algn="ctr"/>
           <a:r>
-            <a:rPr lang="fr-FR" dirty="0" smtClean="0"/>
-            <a:t>Une </a:t>
-          </a:r>
-          <a:r>
-            <a:rPr lang="fr-FR" dirty="0" err="1" smtClean="0"/>
-            <a:t>activit</a:t>
+            <a:rPr lang="de-DE" dirty="0" err="1" smtClean="0"/>
+            <a:t>Gestion</a:t>
           </a:r>
           <a:r>
             <a:rPr lang="de-DE" dirty="0" smtClean="0"/>
-            <a:t>é </a:t>
+            <a:t> des la </a:t>
           </a:r>
           <a:r>
             <a:rPr lang="de-DE" dirty="0" err="1" smtClean="0"/>
-            <a:t>qui</a:t>
+            <a:t>société</a:t>
           </a:r>
           <a:r>
             <a:rPr lang="de-DE" dirty="0" smtClean="0"/>
-            <a:t> </a:t>
+            <a:t> de </a:t>
           </a:r>
           <a:r>
             <a:rPr lang="de-DE" dirty="0" err="1" smtClean="0"/>
-            <a:t>coûte</a:t>
-          </a:r>
-          <a:r>
-            <a:rPr lang="de-DE" dirty="0" smtClean="0"/>
-            <a:t> </a:t>
-          </a:r>
-          <a:r>
-            <a:rPr lang="de-DE" dirty="0" err="1" smtClean="0"/>
-            <a:t>cher</a:t>
+            <a:t>maintenance</a:t>
           </a:r>
           <a:endParaRPr lang="fr-FR" dirty="0" smtClean="0"/>
         </a:p>
@@ -3109,16 +3097,9 @@
           <a:pPr algn="ctr"/>
           <a:r>
             <a:rPr lang="fr-FR" dirty="0" smtClean="0"/>
-            <a:t>40 ateliers qui ne communiquent pas</a:t>
+            <a:t>Gestion du planning et des demandes de maintenance</a:t>
           </a:r>
-        </a:p>
-        <a:p>
-          <a:pPr algn="ctr"/>
-          <a:r>
-            <a:rPr lang="fr-FR" dirty="0" smtClean="0"/>
-            <a:t>Un stock de 10 M €</a:t>
-          </a:r>
-          <a:endParaRPr lang="en-US" dirty="0"/>
+          <a:endParaRPr lang="fr-FR" dirty="0" smtClean="0"/>
         </a:p>
       </dgm:t>
     </dgm:pt>
@@ -3984,36 +3965,24 @@
             </a:spcAft>
           </a:pPr>
           <a:r>
-            <a:rPr lang="fr-FR" sz="1300" kern="1200" dirty="0" smtClean="0"/>
-            <a:t>Une </a:t>
-          </a:r>
-          <a:r>
-            <a:rPr lang="fr-FR" sz="1300" kern="1200" dirty="0" err="1" smtClean="0"/>
-            <a:t>activit</a:t>
+            <a:rPr lang="de-DE" sz="1300" kern="1200" dirty="0" err="1" smtClean="0"/>
+            <a:t>Gestion</a:t>
           </a:r>
           <a:r>
             <a:rPr lang="de-DE" sz="1300" kern="1200" dirty="0" smtClean="0"/>
-            <a:t>é </a:t>
+            <a:t> des la </a:t>
           </a:r>
           <a:r>
             <a:rPr lang="de-DE" sz="1300" kern="1200" dirty="0" err="1" smtClean="0"/>
-            <a:t>qui</a:t>
+            <a:t>société</a:t>
           </a:r>
           <a:r>
             <a:rPr lang="de-DE" sz="1300" kern="1200" dirty="0" smtClean="0"/>
-            <a:t> </a:t>
+            <a:t> de </a:t>
           </a:r>
           <a:r>
             <a:rPr lang="de-DE" sz="1300" kern="1200" dirty="0" err="1" smtClean="0"/>
-            <a:t>coûte</a:t>
-          </a:r>
-          <a:r>
-            <a:rPr lang="de-DE" sz="1300" kern="1200" dirty="0" smtClean="0"/>
-            <a:t> </a:t>
-          </a:r>
-          <a:r>
-            <a:rPr lang="de-DE" sz="1300" kern="1200" dirty="0" err="1" smtClean="0"/>
-            <a:t>cher</a:t>
+            <a:t>maintenance</a:t>
           </a:r>
           <a:endParaRPr lang="fr-FR" sz="1300" kern="1200" dirty="0" smtClean="0"/>
         </a:p>
@@ -4031,26 +4000,9 @@
           </a:pPr>
           <a:r>
             <a:rPr lang="fr-FR" sz="1300" kern="1200" dirty="0" smtClean="0"/>
-            <a:t>40 ateliers qui ne communiquent pas</a:t>
+            <a:t>Gestion du planning et des demandes de maintenance</a:t>
           </a:r>
-        </a:p>
-        <a:p>
-          <a:pPr lvl="0" algn="ctr" defTabSz="577850">
-            <a:lnSpc>
-              <a:spcPct val="90000"/>
-            </a:lnSpc>
-            <a:spcBef>
-              <a:spcPct val="0"/>
-            </a:spcBef>
-            <a:spcAft>
-              <a:spcPct val="35000"/>
-            </a:spcAft>
-          </a:pPr>
-          <a:r>
-            <a:rPr lang="fr-FR" sz="1300" kern="1200" dirty="0" smtClean="0"/>
-            <a:t>Un stock de 10 M €</a:t>
-          </a:r>
-          <a:endParaRPr lang="en-US" sz="1300" kern="1200" dirty="0"/>
+          <a:endParaRPr lang="fr-FR" sz="1300" kern="1200" dirty="0" smtClean="0"/>
         </a:p>
       </dsp:txBody>
       <dsp:txXfrm>
@@ -15541,7 +15493,11 @@
             </a:r>
             <a:r>
               <a:rPr lang="de-DE" sz="2000" dirty="0" smtClean="0"/>
-              <a:t> d‘oeuvre: H4312</a:t>
+              <a:t> d‘oeuvre: </a:t>
+            </a:r>
+            <a:r>
+              <a:rPr lang="de-DE" sz="2000" dirty="0" smtClean="0"/>
+              <a:t>H4312</a:t>
             </a:r>
             <a:endParaRPr lang="en-US" sz="2000" dirty="0"/>
           </a:p>
@@ -16399,7 +16355,7 @@
           <p:nvPr>
             <p:extLst>
               <p:ext uri="{D42A27DB-BD31-4B8C-83A1-F6EECF244321}">
-                <p14:modId xmlns:p14="http://schemas.microsoft.com/office/powerpoint/2010/main" val="2318897463"/>
+                <p14:modId xmlns:p14="http://schemas.microsoft.com/office/powerpoint/2010/main" val="179900534"/>
               </p:ext>
             </p:extLst>
           </p:nvPr>

</xml_diff>